<commit_message>
Adição dos templates do proto-persona e user-stories.
</commit_message>
<xml_diff>
--- a/documentacao/canvas-adaptado.pptx
+++ b/documentacao/canvas-adaptado.pptx
@@ -5,8 +5,7 @@
     <p:sldMasterId id="2147483648" r:id="rId1"/>
   </p:sldMasterIdLst>
   <p:sldIdLst>
-    <p:sldId id="256" r:id="rId2"/>
-    <p:sldId id="257" r:id="rId3"/>
+    <p:sldId id="257" r:id="rId2"/>
   </p:sldIdLst>
   <p:sldSz cx="12192000" cy="6858000"/>
   <p:notesSz cx="6858000" cy="9144000"/>
@@ -271,7 +270,7 @@
           <a:p>
             <a:fld id="{4C661EB7-3496-45A8-B655-6149742E11D6}" type="datetimeFigureOut">
               <a:rPr lang="pt-BR" smtClean="0"/>
-              <a:t>06/09/2019</a:t>
+              <a:t>09/09/2019</a:t>
             </a:fld>
             <a:endParaRPr lang="pt-BR" dirty="0"/>
           </a:p>
@@ -469,7 +468,7 @@
           <a:p>
             <a:fld id="{4C661EB7-3496-45A8-B655-6149742E11D6}" type="datetimeFigureOut">
               <a:rPr lang="pt-BR" smtClean="0"/>
-              <a:t>06/09/2019</a:t>
+              <a:t>09/09/2019</a:t>
             </a:fld>
             <a:endParaRPr lang="pt-BR" dirty="0"/>
           </a:p>
@@ -677,7 +676,7 @@
           <a:p>
             <a:fld id="{4C661EB7-3496-45A8-B655-6149742E11D6}" type="datetimeFigureOut">
               <a:rPr lang="pt-BR" smtClean="0"/>
-              <a:t>06/09/2019</a:t>
+              <a:t>09/09/2019</a:t>
             </a:fld>
             <a:endParaRPr lang="pt-BR" dirty="0"/>
           </a:p>
@@ -875,7 +874,7 @@
           <a:p>
             <a:fld id="{4C661EB7-3496-45A8-B655-6149742E11D6}" type="datetimeFigureOut">
               <a:rPr lang="pt-BR" smtClean="0"/>
-              <a:t>06/09/2019</a:t>
+              <a:t>09/09/2019</a:t>
             </a:fld>
             <a:endParaRPr lang="pt-BR" dirty="0"/>
           </a:p>
@@ -1150,7 +1149,7 @@
           <a:p>
             <a:fld id="{4C661EB7-3496-45A8-B655-6149742E11D6}" type="datetimeFigureOut">
               <a:rPr lang="pt-BR" smtClean="0"/>
-              <a:t>06/09/2019</a:t>
+              <a:t>09/09/2019</a:t>
             </a:fld>
             <a:endParaRPr lang="pt-BR" dirty="0"/>
           </a:p>
@@ -1415,7 +1414,7 @@
           <a:p>
             <a:fld id="{4C661EB7-3496-45A8-B655-6149742E11D6}" type="datetimeFigureOut">
               <a:rPr lang="pt-BR" smtClean="0"/>
-              <a:t>06/09/2019</a:t>
+              <a:t>09/09/2019</a:t>
             </a:fld>
             <a:endParaRPr lang="pt-BR" dirty="0"/>
           </a:p>
@@ -1827,7 +1826,7 @@
           <a:p>
             <a:fld id="{4C661EB7-3496-45A8-B655-6149742E11D6}" type="datetimeFigureOut">
               <a:rPr lang="pt-BR" smtClean="0"/>
-              <a:t>06/09/2019</a:t>
+              <a:t>09/09/2019</a:t>
             </a:fld>
             <a:endParaRPr lang="pt-BR" dirty="0"/>
           </a:p>
@@ -1968,7 +1967,7 @@
           <a:p>
             <a:fld id="{4C661EB7-3496-45A8-B655-6149742E11D6}" type="datetimeFigureOut">
               <a:rPr lang="pt-BR" smtClean="0"/>
-              <a:t>06/09/2019</a:t>
+              <a:t>09/09/2019</a:t>
             </a:fld>
             <a:endParaRPr lang="pt-BR" dirty="0"/>
           </a:p>
@@ -2081,7 +2080,7 @@
           <a:p>
             <a:fld id="{4C661EB7-3496-45A8-B655-6149742E11D6}" type="datetimeFigureOut">
               <a:rPr lang="pt-BR" smtClean="0"/>
-              <a:t>06/09/2019</a:t>
+              <a:t>09/09/2019</a:t>
             </a:fld>
             <a:endParaRPr lang="pt-BR" dirty="0"/>
           </a:p>
@@ -2392,7 +2391,7 @@
           <a:p>
             <a:fld id="{4C661EB7-3496-45A8-B655-6149742E11D6}" type="datetimeFigureOut">
               <a:rPr lang="pt-BR" smtClean="0"/>
-              <a:t>06/09/2019</a:t>
+              <a:t>09/09/2019</a:t>
             </a:fld>
             <a:endParaRPr lang="pt-BR" dirty="0"/>
           </a:p>
@@ -2680,7 +2679,7 @@
           <a:p>
             <a:fld id="{4C661EB7-3496-45A8-B655-6149742E11D6}" type="datetimeFigureOut">
               <a:rPr lang="pt-BR" smtClean="0"/>
-              <a:t>06/09/2019</a:t>
+              <a:t>09/09/2019</a:t>
             </a:fld>
             <a:endParaRPr lang="pt-BR" dirty="0"/>
           </a:p>
@@ -2921,7 +2920,7 @@
           <a:p>
             <a:fld id="{4C661EB7-3496-45A8-B655-6149742E11D6}" type="datetimeFigureOut">
               <a:rPr lang="pt-BR" smtClean="0"/>
-              <a:t>06/09/2019</a:t>
+              <a:t>09/09/2019</a:t>
             </a:fld>
             <a:endParaRPr lang="pt-BR" dirty="0"/>
           </a:p>
@@ -3324,526 +3323,6 @@
 <file path=ppt/slides/slide1.xml><?xml version="1.0" encoding="utf-8"?>
 <p:sld xmlns:a="http://schemas.openxmlformats.org/drawingml/2006/main" xmlns:r="http://schemas.openxmlformats.org/officeDocument/2006/relationships" xmlns:p="http://schemas.openxmlformats.org/presentationml/2006/main">
   <p:cSld>
-    <p:bg>
-      <p:bgPr>
-        <a:solidFill>
-          <a:schemeClr val="bg1"/>
-        </a:solidFill>
-        <a:effectLst/>
-      </p:bgPr>
-    </p:bg>
-    <p:spTree>
-      <p:nvGrpSpPr>
-        <p:cNvPr id="1" name=""/>
-        <p:cNvGrpSpPr/>
-        <p:nvPr/>
-      </p:nvGrpSpPr>
-      <p:grpSpPr>
-        <a:xfrm>
-          <a:off x="0" y="0"/>
-          <a:ext cx="0" cy="0"/>
-          <a:chOff x="0" y="0"/>
-          <a:chExt cx="0" cy="0"/>
-        </a:xfrm>
-      </p:grpSpPr>
-      <p:pic>
-        <p:nvPicPr>
-          <p:cNvPr id="7" name="Imagem 6">
-            <a:extLst>
-              <a:ext uri="{FF2B5EF4-FFF2-40B4-BE49-F238E27FC236}">
-                <a16:creationId xmlns:a16="http://schemas.microsoft.com/office/drawing/2014/main" id="{E7441849-1593-472F-A21D-61E4CD436151}"/>
-              </a:ext>
-            </a:extLst>
-          </p:cNvPr>
-          <p:cNvPicPr>
-            <a:picLocks noChangeAspect="1"/>
-          </p:cNvPicPr>
-          <p:nvPr/>
-        </p:nvPicPr>
-        <p:blipFill rotWithShape="1">
-          <a:blip r:embed="rId2">
-            <a:extLst>
-              <a:ext uri="{28A0092B-C50C-407E-A947-70E740481C1C}">
-                <a14:useLocalDpi xmlns:a14="http://schemas.microsoft.com/office/drawing/2010/main" val="0"/>
-              </a:ext>
-            </a:extLst>
-          </a:blip>
-          <a:srcRect b="15730"/>
-          <a:stretch/>
-        </p:blipFill>
-        <p:spPr>
-          <a:xfrm>
-            <a:off x="-1" y="10"/>
-            <a:ext cx="12192000" cy="6857990"/>
-          </a:xfrm>
-          <a:prstGeom prst="rect">
-            <a:avLst/>
-          </a:prstGeom>
-        </p:spPr>
-      </p:pic>
-      <p:sp>
-        <p:nvSpPr>
-          <p:cNvPr id="12" name="Freeform 5">
-            <a:extLst>
-              <a:ext uri="{FF2B5EF4-FFF2-40B4-BE49-F238E27FC236}">
-                <a16:creationId xmlns:a16="http://schemas.microsoft.com/office/drawing/2014/main" id="{3CD9DF72-87A3-404E-A828-84CBF11A8303}"/>
-              </a:ext>
-              <a:ext uri="{C183D7F6-B498-43B3-948B-1728B52AA6E4}">
-                <adec:decorative xmlns:adec="http://schemas.microsoft.com/office/drawing/2017/decorative" val="1"/>
-              </a:ext>
-            </a:extLst>
-          </p:cNvPr>
-          <p:cNvSpPr>
-            <a:spLocks noGrp="1" noRot="1" noChangeAspect="1" noMove="1" noResize="1" noEditPoints="1" noAdjustHandles="1" noChangeArrowheads="1" noChangeShapeType="1" noTextEdit="1"/>
-          </p:cNvSpPr>
-          <p:nvPr>
-            <p:extLst>
-              <p:ext uri="{386F3935-93C4-4BCD-93E2-E3B085C9AB24}">
-                <p16:designElem xmlns:p16="http://schemas.microsoft.com/office/powerpoint/2015/main" val="1"/>
-              </p:ext>
-            </p:extLst>
-          </p:nvPr>
-        </p:nvSpPr>
-        <p:spPr bwMode="grayWhite">
-          <a:xfrm flipH="1">
-            <a:off x="0" y="998175"/>
-            <a:ext cx="6017172" cy="5859825"/>
-          </a:xfrm>
-          <a:custGeom>
-            <a:avLst/>
-            <a:gdLst>
-              <a:gd name="T0" fmla="*/ 1333 w 1333"/>
-              <a:gd name="T1" fmla="*/ 1031 h 1298"/>
-              <a:gd name="T2" fmla="*/ 1333 w 1333"/>
-              <a:gd name="T3" fmla="*/ 380 h 1298"/>
-              <a:gd name="T4" fmla="*/ 706 w 1333"/>
-              <a:gd name="T5" fmla="*/ 0 h 1298"/>
-              <a:gd name="T6" fmla="*/ 0 w 1333"/>
-              <a:gd name="T7" fmla="*/ 706 h 1298"/>
-              <a:gd name="T8" fmla="*/ 323 w 1333"/>
-              <a:gd name="T9" fmla="*/ 1298 h 1298"/>
-              <a:gd name="T10" fmla="*/ 1090 w 1333"/>
-              <a:gd name="T11" fmla="*/ 1298 h 1298"/>
-              <a:gd name="T12" fmla="*/ 1333 w 1333"/>
-              <a:gd name="T13" fmla="*/ 1031 h 1298"/>
-            </a:gdLst>
-            <a:ahLst/>
-            <a:cxnLst>
-              <a:cxn ang="0">
-                <a:pos x="T0" y="T1"/>
-              </a:cxn>
-              <a:cxn ang="0">
-                <a:pos x="T2" y="T3"/>
-              </a:cxn>
-              <a:cxn ang="0">
-                <a:pos x="T4" y="T5"/>
-              </a:cxn>
-              <a:cxn ang="0">
-                <a:pos x="T6" y="T7"/>
-              </a:cxn>
-              <a:cxn ang="0">
-                <a:pos x="T8" y="T9"/>
-              </a:cxn>
-              <a:cxn ang="0">
-                <a:pos x="T10" y="T11"/>
-              </a:cxn>
-              <a:cxn ang="0">
-                <a:pos x="T12" y="T13"/>
-              </a:cxn>
-            </a:cxnLst>
-            <a:rect l="0" t="0" r="r" b="b"/>
-            <a:pathLst>
-              <a:path w="1333" h="1298">
-                <a:moveTo>
-                  <a:pt x="1333" y="1031"/>
-                </a:moveTo>
-                <a:cubicBezTo>
-                  <a:pt x="1333" y="380"/>
-                  <a:pt x="1333" y="380"/>
-                  <a:pt x="1333" y="380"/>
-                </a:cubicBezTo>
-                <a:cubicBezTo>
-                  <a:pt x="1215" y="154"/>
-                  <a:pt x="979" y="0"/>
-                  <a:pt x="706" y="0"/>
-                </a:cubicBezTo>
-                <a:cubicBezTo>
-                  <a:pt x="317" y="0"/>
-                  <a:pt x="0" y="316"/>
-                  <a:pt x="0" y="706"/>
-                </a:cubicBezTo>
-                <a:cubicBezTo>
-                  <a:pt x="0" y="954"/>
-                  <a:pt x="129" y="1172"/>
-                  <a:pt x="323" y="1298"/>
-                </a:cubicBezTo>
-                <a:cubicBezTo>
-                  <a:pt x="1090" y="1298"/>
-                  <a:pt x="1090" y="1298"/>
-                  <a:pt x="1090" y="1298"/>
-                </a:cubicBezTo>
-                <a:cubicBezTo>
-                  <a:pt x="1193" y="1232"/>
-                  <a:pt x="1276" y="1140"/>
-                  <a:pt x="1333" y="1031"/>
-                </a:cubicBezTo>
-                <a:close/>
-              </a:path>
-            </a:pathLst>
-          </a:custGeom>
-          <a:solidFill>
-            <a:schemeClr val="bg1">
-              <a:alpha val="75000"/>
-            </a:schemeClr>
-          </a:solidFill>
-          <a:ln w="50800" cap="sq" cmpd="dbl">
-            <a:noFill/>
-            <a:miter lim="800000"/>
-          </a:ln>
-          <a:effectLst/>
-        </p:spPr>
-        <p:txBody>
-          <a:bodyPr vert="horz" lIns="91440" tIns="45720" rIns="91440" bIns="45720" rtlCol="0" anchor="t">
-            <a:normAutofit/>
-          </a:bodyPr>
-          <a:lstStyle/>
-          <a:p>
-            <a:pPr algn="ctr">
-              <a:spcAft>
-                <a:spcPts val="1000"/>
-              </a:spcAft>
-              <a:buClr>
-                <a:schemeClr val="tx1"/>
-              </a:buClr>
-              <a:buSzPct val="100000"/>
-              <a:buFont typeface="Arial"/>
-              <a:buNone/>
-            </a:pPr>
-            <a:endParaRPr lang="en-US" sz="1600" cap="all" dirty="0">
-              <a:latin typeface="Arial" panose="020B0604020202020204" pitchFamily="34" charset="0"/>
-              <a:cs typeface="Arial" panose="020B0604020202020204" pitchFamily="34" charset="0"/>
-            </a:endParaRPr>
-          </a:p>
-        </p:txBody>
-      </p:sp>
-      <p:sp>
-        <p:nvSpPr>
-          <p:cNvPr id="4" name="CaixaDeTexto 3">
-            <a:extLst>
-              <a:ext uri="{FF2B5EF4-FFF2-40B4-BE49-F238E27FC236}">
-                <a16:creationId xmlns:a16="http://schemas.microsoft.com/office/drawing/2014/main" id="{85BD4850-A97F-474A-B107-9AB4DFD9AFC1}"/>
-              </a:ext>
-            </a:extLst>
-          </p:cNvPr>
-          <p:cNvSpPr txBox="1"/>
-          <p:nvPr/>
-        </p:nvSpPr>
-        <p:spPr>
-          <a:xfrm>
-            <a:off x="709448" y="1913950"/>
-            <a:ext cx="4204137" cy="1342754"/>
-          </a:xfrm>
-          <a:prstGeom prst="rect">
-            <a:avLst/>
-          </a:prstGeom>
-        </p:spPr>
-        <p:txBody>
-          <a:bodyPr vert="horz" lIns="91440" tIns="45720" rIns="91440" bIns="45720" rtlCol="0" anchor="ctr">
-            <a:normAutofit/>
-          </a:bodyPr>
-          <a:lstStyle/>
-          <a:p>
-            <a:pPr algn="ctr">
-              <a:lnSpc>
-                <a:spcPct val="90000"/>
-              </a:lnSpc>
-              <a:spcBef>
-                <a:spcPct val="0"/>
-              </a:spcBef>
-              <a:spcAft>
-                <a:spcPts val="600"/>
-              </a:spcAft>
-            </a:pPr>
-            <a:r>
-              <a:rPr lang="en-US" sz="3600" dirty="0">
-                <a:latin typeface="Arial" panose="020B0604020202020204" pitchFamily="34" charset="0"/>
-                <a:ea typeface="+mj-ea"/>
-                <a:cs typeface="Arial" panose="020B0604020202020204" pitchFamily="34" charset="0"/>
-              </a:rPr>
-              <a:t>Canvas Adaptado</a:t>
-            </a:r>
-          </a:p>
-          <a:p>
-            <a:pPr algn="ctr">
-              <a:lnSpc>
-                <a:spcPct val="90000"/>
-              </a:lnSpc>
-              <a:spcBef>
-                <a:spcPct val="0"/>
-              </a:spcBef>
-              <a:spcAft>
-                <a:spcPts val="600"/>
-              </a:spcAft>
-            </a:pPr>
-            <a:r>
-              <a:rPr lang="en-US" sz="1600" dirty="0">
-                <a:latin typeface="Arial" panose="020B0604020202020204" pitchFamily="34" charset="0"/>
-                <a:ea typeface="+mj-ea"/>
-                <a:cs typeface="Arial" panose="020B0604020202020204" pitchFamily="34" charset="0"/>
-              </a:rPr>
-              <a:t>DataSource</a:t>
-            </a:r>
-          </a:p>
-        </p:txBody>
-      </p:sp>
-      <p:cxnSp>
-        <p:nvCxnSpPr>
-          <p:cNvPr id="14" name="Straight Connector 13">
-            <a:extLst>
-              <a:ext uri="{FF2B5EF4-FFF2-40B4-BE49-F238E27FC236}">
-                <a16:creationId xmlns:a16="http://schemas.microsoft.com/office/drawing/2014/main" id="{20E3A342-4D61-4E3F-AF90-1AB42AEB96CC}"/>
-              </a:ext>
-              <a:ext uri="{C183D7F6-B498-43B3-948B-1728B52AA6E4}">
-                <adec:decorative xmlns:adec="http://schemas.microsoft.com/office/drawing/2017/decorative" val="1"/>
-              </a:ext>
-            </a:extLst>
-          </p:cNvPr>
-          <p:cNvCxnSpPr>
-            <a:cxnSpLocks noGrp="1" noRot="1" noChangeAspect="1" noMove="1" noResize="1" noEditPoints="1" noAdjustHandles="1" noChangeArrowheads="1" noChangeShapeType="1"/>
-          </p:cNvCxnSpPr>
-          <p:nvPr>
-            <p:extLst>
-              <p:ext uri="{386F3935-93C4-4BCD-93E2-E3B085C9AB24}">
-                <p16:designElem xmlns:p16="http://schemas.microsoft.com/office/powerpoint/2015/main" val="1"/>
-              </p:ext>
-            </p:extLst>
-          </p:nvPr>
-        </p:nvCxnSpPr>
-        <p:spPr>
-          <a:xfrm>
-            <a:off x="2287051" y="3337139"/>
-            <a:ext cx="935420" cy="0"/>
-          </a:xfrm>
-          <a:prstGeom prst="line">
-            <a:avLst/>
-          </a:prstGeom>
-          <a:ln w="25400" cap="sq">
-            <a:solidFill>
-              <a:schemeClr val="tx1">
-                <a:lumMod val="85000"/>
-                <a:lumOff val="15000"/>
-              </a:schemeClr>
-            </a:solidFill>
-            <a:bevel/>
-          </a:ln>
-        </p:spPr>
-        <p:style>
-          <a:lnRef idx="1">
-            <a:schemeClr val="accent1"/>
-          </a:lnRef>
-          <a:fillRef idx="0">
-            <a:schemeClr val="accent1"/>
-          </a:fillRef>
-          <a:effectRef idx="0">
-            <a:schemeClr val="accent1"/>
-          </a:effectRef>
-          <a:fontRef idx="minor">
-            <a:schemeClr val="tx1"/>
-          </a:fontRef>
-        </p:style>
-      </p:cxnSp>
-      <p:sp>
-        <p:nvSpPr>
-          <p:cNvPr id="5" name="CaixaDeTexto 4">
-            <a:extLst>
-              <a:ext uri="{FF2B5EF4-FFF2-40B4-BE49-F238E27FC236}">
-                <a16:creationId xmlns:a16="http://schemas.microsoft.com/office/drawing/2014/main" id="{C2FDB487-2ABC-4A08-9BA1-28825A3C595B}"/>
-              </a:ext>
-            </a:extLst>
-          </p:cNvPr>
-          <p:cNvSpPr txBox="1"/>
-          <p:nvPr/>
-        </p:nvSpPr>
-        <p:spPr>
-          <a:xfrm>
-            <a:off x="525516" y="3417573"/>
-            <a:ext cx="4593021" cy="2619839"/>
-          </a:xfrm>
-          <a:prstGeom prst="rect">
-            <a:avLst/>
-          </a:prstGeom>
-        </p:spPr>
-        <p:txBody>
-          <a:bodyPr vert="horz" lIns="91440" tIns="45720" rIns="91440" bIns="45720" rtlCol="0" anchor="ctr">
-            <a:normAutofit/>
-          </a:bodyPr>
-          <a:lstStyle/>
-          <a:p>
-            <a:pPr>
-              <a:lnSpc>
-                <a:spcPct val="90000"/>
-              </a:lnSpc>
-              <a:spcAft>
-                <a:spcPts val="600"/>
-              </a:spcAft>
-            </a:pPr>
-            <a:r>
-              <a:rPr lang="en-US" b="1" dirty="0">
-                <a:latin typeface="Arial" panose="020B0604020202020204" pitchFamily="34" charset="0"/>
-                <a:cs typeface="Arial" panose="020B0604020202020204" pitchFamily="34" charset="0"/>
-              </a:rPr>
-              <a:t>Grupo 6 – Integrantes:</a:t>
-            </a:r>
-          </a:p>
-          <a:p>
-            <a:pPr lvl="1" indent="-228600">
-              <a:lnSpc>
-                <a:spcPct val="90000"/>
-              </a:lnSpc>
-              <a:spcAft>
-                <a:spcPts val="600"/>
-              </a:spcAft>
-              <a:buFont typeface="Arial" panose="020B0604020202020204" pitchFamily="34" charset="0"/>
-              <a:buChar char="•"/>
-            </a:pPr>
-            <a:r>
-              <a:rPr lang="en-US" dirty="0">
-                <a:latin typeface="Arial" panose="020B0604020202020204" pitchFamily="34" charset="0"/>
-                <a:cs typeface="Arial" panose="020B0604020202020204" pitchFamily="34" charset="0"/>
-              </a:rPr>
-              <a:t>01191009 – Fernando Oliveira</a:t>
-            </a:r>
-          </a:p>
-          <a:p>
-            <a:pPr lvl="1" indent="-228600">
-              <a:lnSpc>
-                <a:spcPct val="90000"/>
-              </a:lnSpc>
-              <a:spcAft>
-                <a:spcPts val="600"/>
-              </a:spcAft>
-              <a:buFont typeface="Arial" panose="020B0604020202020204" pitchFamily="34" charset="0"/>
-              <a:buChar char="•"/>
-            </a:pPr>
-            <a:r>
-              <a:rPr lang="en-US" dirty="0">
-                <a:latin typeface="Arial"/>
-                <a:cs typeface="Arial"/>
-              </a:rPr>
-              <a:t>01191085 – João </a:t>
-            </a:r>
-            <a:r>
-              <a:rPr lang="pt-BR" dirty="0">
-                <a:latin typeface="Arial"/>
-                <a:cs typeface="Arial"/>
-              </a:rPr>
-              <a:t>Vinícius</a:t>
-            </a:r>
-            <a:r>
-              <a:rPr lang="en-US" dirty="0">
-                <a:latin typeface="Arial"/>
-                <a:cs typeface="Arial"/>
-              </a:rPr>
-              <a:t> Santana</a:t>
-            </a:r>
-          </a:p>
-          <a:p>
-            <a:pPr lvl="1" indent="-228600">
-              <a:lnSpc>
-                <a:spcPct val="90000"/>
-              </a:lnSpc>
-              <a:spcAft>
-                <a:spcPts val="600"/>
-              </a:spcAft>
-              <a:buFont typeface="Arial" panose="020B0604020202020204" pitchFamily="34" charset="0"/>
-              <a:buChar char="•"/>
-            </a:pPr>
-            <a:r>
-              <a:rPr lang="en-US" dirty="0">
-                <a:latin typeface="Arial"/>
-                <a:cs typeface="Arial"/>
-              </a:rPr>
-              <a:t>01191</a:t>
-            </a:r>
-            <a:r>
-              <a:rPr lang="en-US" dirty="0">
-                <a:latin typeface="Arial"/>
-                <a:ea typeface="+mn-lt"/>
-                <a:cs typeface="+mn-lt"/>
-              </a:rPr>
-              <a:t>083</a:t>
-            </a:r>
-            <a:r>
-              <a:rPr lang="en-US" b="1" dirty="0">
-                <a:latin typeface="Arial"/>
-                <a:cs typeface="Arial"/>
-              </a:rPr>
-              <a:t> </a:t>
-            </a:r>
-            <a:r>
-              <a:rPr lang="en-US" dirty="0">
-                <a:latin typeface="Arial"/>
-                <a:cs typeface="Arial"/>
-              </a:rPr>
-              <a:t>– Kessi Santana</a:t>
-            </a:r>
-          </a:p>
-          <a:p>
-            <a:pPr lvl="1" indent="-228600">
-              <a:lnSpc>
-                <a:spcPct val="90000"/>
-              </a:lnSpc>
-              <a:spcAft>
-                <a:spcPts val="600"/>
-              </a:spcAft>
-              <a:buFont typeface="Arial" panose="020B0604020202020204" pitchFamily="34" charset="0"/>
-              <a:buChar char="•"/>
-            </a:pPr>
-            <a:r>
-              <a:rPr lang="en-US" dirty="0">
-                <a:latin typeface="Arial"/>
-                <a:cs typeface="Arial"/>
-              </a:rPr>
-              <a:t>01191103 – Thalita Igwe</a:t>
-            </a:r>
-          </a:p>
-          <a:p>
-            <a:pPr lvl="1" indent="-228600">
-              <a:lnSpc>
-                <a:spcPct val="90000"/>
-              </a:lnSpc>
-              <a:spcAft>
-                <a:spcPts val="600"/>
-              </a:spcAft>
-              <a:buFont typeface="Arial" panose="020B0604020202020204" pitchFamily="34" charset="0"/>
-              <a:buChar char="•"/>
-            </a:pPr>
-            <a:r>
-              <a:rPr lang="en-US" dirty="0">
-                <a:latin typeface="Arial" panose="020B0604020202020204" pitchFamily="34" charset="0"/>
-                <a:cs typeface="Arial" panose="020B0604020202020204" pitchFamily="34" charset="0"/>
-              </a:rPr>
-              <a:t>01191035 – Vitoria Ferreira</a:t>
-            </a:r>
-          </a:p>
-        </p:txBody>
-      </p:sp>
-    </p:spTree>
-    <p:extLst>
-      <p:ext uri="{BB962C8B-B14F-4D97-AF65-F5344CB8AC3E}">
-        <p14:creationId xmlns:p14="http://schemas.microsoft.com/office/powerpoint/2010/main" val="4078476122"/>
-      </p:ext>
-    </p:extLst>
-  </p:cSld>
-  <p:clrMapOvr>
-    <a:masterClrMapping/>
-  </p:clrMapOvr>
-</p:sld>
-</file>
-
-<file path=ppt/slides/slide2.xml><?xml version="1.0" encoding="utf-8"?>
-<p:sld xmlns:a="http://schemas.openxmlformats.org/drawingml/2006/main" xmlns:r="http://schemas.openxmlformats.org/officeDocument/2006/relationships" xmlns:p="http://schemas.openxmlformats.org/presentationml/2006/main">
-  <p:cSld>
     <p:spTree>
       <p:nvGrpSpPr>
         <p:cNvPr id="1" name=""/>
@@ -4061,7 +3540,17 @@
                 <a:latin typeface="Segoe Print" panose="02000600000000000000" pitchFamily="2" charset="0"/>
                 <a:cs typeface="MV Boli" panose="02000500030200090000" pitchFamily="2" charset="0"/>
               </a:rPr>
-              <a:t>Gerenciamento de processos</a:t>
+              <a:t>Gerenciamento de </a:t>
+            </a:r>
+            <a:r>
+              <a:rPr lang="pt-BR" sz="1100" dirty="0">
+                <a:solidFill>
+                  <a:schemeClr val="bg1"/>
+                </a:solidFill>
+                <a:latin typeface="Segoe Print" panose="02000600000000000000" pitchFamily="2" charset="0"/>
+                <a:cs typeface="MV Boli" panose="02000500030200090000" pitchFamily="2" charset="0"/>
+              </a:rPr>
+              <a:t>processos</a:t>
             </a:r>
           </a:p>
         </p:txBody>

</xml_diff>

<commit_message>
Subindo canvas adaptado atualizado
</commit_message>
<xml_diff>
--- a/documentacao/canvas-adaptado.pptx
+++ b/documentacao/canvas-adaptado.pptx
@@ -270,7 +270,7 @@
           <a:p>
             <a:fld id="{4C661EB7-3496-45A8-B655-6149742E11D6}" type="datetimeFigureOut">
               <a:rPr lang="pt-BR" smtClean="0"/>
-              <a:t>09/09/2019</a:t>
+              <a:t>11/09/2019</a:t>
             </a:fld>
             <a:endParaRPr lang="pt-BR" dirty="0"/>
           </a:p>
@@ -468,7 +468,7 @@
           <a:p>
             <a:fld id="{4C661EB7-3496-45A8-B655-6149742E11D6}" type="datetimeFigureOut">
               <a:rPr lang="pt-BR" smtClean="0"/>
-              <a:t>09/09/2019</a:t>
+              <a:t>11/09/2019</a:t>
             </a:fld>
             <a:endParaRPr lang="pt-BR" dirty="0"/>
           </a:p>
@@ -676,7 +676,7 @@
           <a:p>
             <a:fld id="{4C661EB7-3496-45A8-B655-6149742E11D6}" type="datetimeFigureOut">
               <a:rPr lang="pt-BR" smtClean="0"/>
-              <a:t>09/09/2019</a:t>
+              <a:t>11/09/2019</a:t>
             </a:fld>
             <a:endParaRPr lang="pt-BR" dirty="0"/>
           </a:p>
@@ -874,7 +874,7 @@
           <a:p>
             <a:fld id="{4C661EB7-3496-45A8-B655-6149742E11D6}" type="datetimeFigureOut">
               <a:rPr lang="pt-BR" smtClean="0"/>
-              <a:t>09/09/2019</a:t>
+              <a:t>11/09/2019</a:t>
             </a:fld>
             <a:endParaRPr lang="pt-BR" dirty="0"/>
           </a:p>
@@ -1149,7 +1149,7 @@
           <a:p>
             <a:fld id="{4C661EB7-3496-45A8-B655-6149742E11D6}" type="datetimeFigureOut">
               <a:rPr lang="pt-BR" smtClean="0"/>
-              <a:t>09/09/2019</a:t>
+              <a:t>11/09/2019</a:t>
             </a:fld>
             <a:endParaRPr lang="pt-BR" dirty="0"/>
           </a:p>
@@ -1414,7 +1414,7 @@
           <a:p>
             <a:fld id="{4C661EB7-3496-45A8-B655-6149742E11D6}" type="datetimeFigureOut">
               <a:rPr lang="pt-BR" smtClean="0"/>
-              <a:t>09/09/2019</a:t>
+              <a:t>11/09/2019</a:t>
             </a:fld>
             <a:endParaRPr lang="pt-BR" dirty="0"/>
           </a:p>
@@ -1826,7 +1826,7 @@
           <a:p>
             <a:fld id="{4C661EB7-3496-45A8-B655-6149742E11D6}" type="datetimeFigureOut">
               <a:rPr lang="pt-BR" smtClean="0"/>
-              <a:t>09/09/2019</a:t>
+              <a:t>11/09/2019</a:t>
             </a:fld>
             <a:endParaRPr lang="pt-BR" dirty="0"/>
           </a:p>
@@ -1967,7 +1967,7 @@
           <a:p>
             <a:fld id="{4C661EB7-3496-45A8-B655-6149742E11D6}" type="datetimeFigureOut">
               <a:rPr lang="pt-BR" smtClean="0"/>
-              <a:t>09/09/2019</a:t>
+              <a:t>11/09/2019</a:t>
             </a:fld>
             <a:endParaRPr lang="pt-BR" dirty="0"/>
           </a:p>
@@ -2080,7 +2080,7 @@
           <a:p>
             <a:fld id="{4C661EB7-3496-45A8-B655-6149742E11D6}" type="datetimeFigureOut">
               <a:rPr lang="pt-BR" smtClean="0"/>
-              <a:t>09/09/2019</a:t>
+              <a:t>11/09/2019</a:t>
             </a:fld>
             <a:endParaRPr lang="pt-BR" dirty="0"/>
           </a:p>
@@ -2391,7 +2391,7 @@
           <a:p>
             <a:fld id="{4C661EB7-3496-45A8-B655-6149742E11D6}" type="datetimeFigureOut">
               <a:rPr lang="pt-BR" smtClean="0"/>
-              <a:t>09/09/2019</a:t>
+              <a:t>11/09/2019</a:t>
             </a:fld>
             <a:endParaRPr lang="pt-BR" dirty="0"/>
           </a:p>
@@ -2679,7 +2679,7 @@
           <a:p>
             <a:fld id="{4C661EB7-3496-45A8-B655-6149742E11D6}" type="datetimeFigureOut">
               <a:rPr lang="pt-BR" smtClean="0"/>
-              <a:t>09/09/2019</a:t>
+              <a:t>11/09/2019</a:t>
             </a:fld>
             <a:endParaRPr lang="pt-BR" dirty="0"/>
           </a:p>
@@ -2920,7 +2920,7 @@
           <a:p>
             <a:fld id="{4C661EB7-3496-45A8-B655-6149742E11D6}" type="datetimeFigureOut">
               <a:rPr lang="pt-BR" smtClean="0"/>
-              <a:t>09/09/2019</a:t>
+              <a:t>11/09/2019</a:t>
             </a:fld>
             <a:endParaRPr lang="pt-BR" dirty="0"/>
           </a:p>
@@ -3358,7 +3358,10 @@
             <a:avLst/>
           </a:prstGeom>
           <a:solidFill>
-            <a:srgbClr val="99FF99"/>
+            <a:schemeClr val="tx2">
+              <a:lumMod val="60000"/>
+              <a:lumOff val="40000"/>
+            </a:schemeClr>
           </a:solidFill>
           <a:ln w="3175">
             <a:solidFill>
@@ -3397,12 +3400,12 @@
           <a:p>
             <a:pPr algn="ctr"/>
             <a:r>
-              <a:rPr lang="pt-BR" sz="1100" dirty="0">
+              <a:rPr lang="pt-BR" sz="1100" b="1" dirty="0">
                 <a:solidFill>
                   <a:schemeClr val="tx1"/>
                 </a:solidFill>
-                <a:latin typeface="Segoe Print" panose="02000600000000000000" pitchFamily="2" charset="0"/>
-                <a:cs typeface="MV Boli" panose="02000500030200090000" pitchFamily="2" charset="0"/>
+                <a:latin typeface="Arial" panose="020B0604020202020204" pitchFamily="34" charset="0"/>
+                <a:cs typeface="Arial" panose="020B0604020202020204" pitchFamily="34" charset="0"/>
               </a:rPr>
               <a:t>Identificar processos considerados importantes e prioriza-los</a:t>
             </a:r>
@@ -3430,7 +3433,10 @@
             <a:avLst/>
           </a:prstGeom>
           <a:solidFill>
-            <a:schemeClr val="tx2"/>
+            <a:schemeClr val="accent5">
+              <a:lumMod val="60000"/>
+              <a:lumOff val="40000"/>
+            </a:schemeClr>
           </a:solidFill>
           <a:ln>
             <a:noFill/>
@@ -3465,12 +3471,12 @@
           <a:p>
             <a:pPr algn="ctr"/>
             <a:r>
-              <a:rPr lang="pt-BR" sz="1100" dirty="0">
+              <a:rPr lang="pt-BR" sz="1100" b="1" dirty="0">
                 <a:solidFill>
                   <a:schemeClr val="tx1"/>
                 </a:solidFill>
-                <a:latin typeface="Segoe Print" panose="02000600000000000000" pitchFamily="2" charset="0"/>
-                <a:cs typeface="MV Boli" panose="02000500030200090000" pitchFamily="2" charset="0"/>
+                <a:latin typeface="Arial" panose="020B0604020202020204" pitchFamily="34" charset="0"/>
+                <a:cs typeface="Arial" panose="020B0604020202020204" pitchFamily="34" charset="0"/>
               </a:rPr>
               <a:t>Priorização de processos</a:t>
             </a:r>
@@ -3498,7 +3504,10 @@
             <a:avLst/>
           </a:prstGeom>
           <a:solidFill>
-            <a:schemeClr val="tx2"/>
+            <a:schemeClr val="accent5">
+              <a:lumMod val="60000"/>
+              <a:lumOff val="40000"/>
+            </a:schemeClr>
           </a:solidFill>
           <a:ln>
             <a:noFill/>
@@ -3533,24 +3542,14 @@
           <a:p>
             <a:pPr algn="ctr" defTabSz="1149969"/>
             <a:r>
-              <a:rPr lang="pt-BR" sz="1100" dirty="0">
+              <a:rPr lang="pt-BR" sz="1100" b="1" dirty="0">
                 <a:solidFill>
                   <a:schemeClr val="tx1"/>
                 </a:solidFill>
-                <a:latin typeface="Segoe Print" panose="02000600000000000000" pitchFamily="2" charset="0"/>
-                <a:cs typeface="MV Boli" panose="02000500030200090000" pitchFamily="2" charset="0"/>
+                <a:latin typeface="Arial" panose="020B0604020202020204" pitchFamily="34" charset="0"/>
+                <a:cs typeface="Arial" panose="020B0604020202020204" pitchFamily="34" charset="0"/>
               </a:rPr>
-              <a:t>Gerenciamento de </a:t>
-            </a:r>
-            <a:r>
-              <a:rPr lang="pt-BR" sz="1100" dirty="0">
-                <a:solidFill>
-                  <a:schemeClr val="bg1"/>
-                </a:solidFill>
-                <a:latin typeface="Segoe Print" panose="02000600000000000000" pitchFamily="2" charset="0"/>
-                <a:cs typeface="MV Boli" panose="02000500030200090000" pitchFamily="2" charset="0"/>
-              </a:rPr>
-              <a:t>processos</a:t>
+              <a:t>Gerenciamento de processos</a:t>
             </a:r>
           </a:p>
         </p:txBody>
@@ -3749,12 +3748,12 @@
           <a:p>
             <a:pPr algn="ctr" defTabSz="1149969"/>
             <a:r>
-              <a:rPr lang="pt-BR" sz="1100" dirty="0">
+              <a:rPr lang="pt-BR" sz="1100" b="1" dirty="0">
                 <a:solidFill>
                   <a:schemeClr val="tx1"/>
                 </a:solidFill>
-                <a:latin typeface="Segoe Print" panose="02000600000000000000" pitchFamily="2" charset="0"/>
-                <a:cs typeface="MV Boli" panose="02000500030200090000" pitchFamily="2" charset="0"/>
+                <a:latin typeface="Arial" panose="020B0604020202020204" pitchFamily="34" charset="0"/>
+                <a:cs typeface="Arial" panose="020B0604020202020204" pitchFamily="34" charset="0"/>
               </a:rPr>
               <a:t>Empresas que possuem servidores de jogos online</a:t>
             </a:r>
@@ -3853,7 +3852,7 @@
         </p:nvSpPr>
         <p:spPr>
           <a:xfrm>
-            <a:off x="5271755" y="185628"/>
+            <a:off x="4919232" y="177146"/>
             <a:ext cx="1930400" cy="338554"/>
           </a:xfrm>
           <a:prstGeom prst="rect">
@@ -3892,7 +3891,7 @@
         </p:nvSpPr>
         <p:spPr>
           <a:xfrm>
-            <a:off x="8690858" y="36832"/>
+            <a:off x="9140348" y="50209"/>
             <a:ext cx="2286392" cy="584775"/>
           </a:xfrm>
           <a:prstGeom prst="rect">
@@ -3973,12 +3972,12 @@
           <a:p>
             <a:pPr algn="ctr" defTabSz="1149969"/>
             <a:r>
-              <a:rPr lang="pt-BR" sz="1100" dirty="0">
+              <a:rPr lang="pt-BR" sz="1100" b="1" dirty="0">
                 <a:solidFill>
                   <a:schemeClr val="tx1"/>
                 </a:solidFill>
-                <a:latin typeface="Segoe Print" panose="02000600000000000000" pitchFamily="2" charset="0"/>
-                <a:cs typeface="MV Boli" panose="02000500030200090000" pitchFamily="2" charset="0"/>
+                <a:latin typeface="Arial" panose="020B0604020202020204" pitchFamily="34" charset="0"/>
+                <a:cs typeface="Arial" panose="020B0604020202020204" pitchFamily="34" charset="0"/>
               </a:rPr>
               <a:t>Gamers</a:t>
             </a:r>
@@ -4006,8 +4005,9 @@
             <a:avLst/>
           </a:prstGeom>
           <a:solidFill>
-            <a:schemeClr val="accent1">
-              <a:lumMod val="75000"/>
+            <a:schemeClr val="accent3">
+              <a:lumMod val="20000"/>
+              <a:lumOff val="80000"/>
             </a:schemeClr>
           </a:solidFill>
           <a:ln>
@@ -4043,12 +4043,12 @@
           <a:p>
             <a:pPr algn="ctr"/>
             <a:r>
-              <a:rPr lang="pt-BR" sz="1100" dirty="0">
+              <a:rPr lang="pt-BR" sz="1100" b="1" dirty="0">
                 <a:solidFill>
                   <a:schemeClr val="tx1"/>
                 </a:solidFill>
-                <a:latin typeface="Segoe Print" panose="02000600000000000000" pitchFamily="2" charset="0"/>
-                <a:cs typeface="MV Boli" panose="02000500030200090000" pitchFamily="2" charset="0"/>
+                <a:latin typeface="Arial" panose="020B0604020202020204" pitchFamily="34" charset="0"/>
+                <a:cs typeface="Arial" panose="020B0604020202020204" pitchFamily="34" charset="0"/>
               </a:rPr>
               <a:t>Alertas </a:t>
             </a:r>
@@ -4076,7 +4076,10 @@
             <a:avLst/>
           </a:prstGeom>
           <a:solidFill>
-            <a:srgbClr val="FFFF99"/>
+            <a:schemeClr val="accent1">
+              <a:lumMod val="40000"/>
+              <a:lumOff val="60000"/>
+            </a:schemeClr>
           </a:solidFill>
           <a:ln>
             <a:noFill/>
@@ -4111,12 +4114,12 @@
           <a:p>
             <a:pPr algn="ctr"/>
             <a:r>
-              <a:rPr lang="pt-BR" sz="1100" dirty="0">
+              <a:rPr lang="pt-BR" sz="1100" b="1" dirty="0">
                 <a:solidFill>
                   <a:schemeClr val="tx1"/>
                 </a:solidFill>
-                <a:latin typeface="Segoe Print" panose="02000600000000000000" pitchFamily="2" charset="0"/>
-                <a:cs typeface="MV Boli" panose="02000500030200090000" pitchFamily="2" charset="0"/>
+                <a:latin typeface="Arial" panose="020B0604020202020204" pitchFamily="34" charset="0"/>
+                <a:cs typeface="Arial" panose="020B0604020202020204" pitchFamily="34" charset="0"/>
               </a:rPr>
               <a:t>Monitoramento de servidor</a:t>
             </a:r>
@@ -4144,7 +4147,7 @@
             <a:avLst/>
           </a:prstGeom>
           <a:solidFill>
-            <a:srgbClr val="FFFF99"/>
+            <a:schemeClr val="accent5"/>
           </a:solidFill>
           <a:ln>
             <a:noFill/>
@@ -4179,14 +4182,14 @@
           <a:p>
             <a:pPr algn="ctr"/>
             <a:r>
-              <a:rPr lang="pt-BR" sz="1100" dirty="0">
+              <a:rPr lang="pt-BR" sz="1100" b="1" dirty="0">
                 <a:solidFill>
                   <a:schemeClr val="tx1"/>
                 </a:solidFill>
-                <a:latin typeface="Segoe Print" panose="02000600000000000000" pitchFamily="2" charset="0"/>
-                <a:cs typeface="MV Boli" panose="02000500030200090000" pitchFamily="2" charset="0"/>
+                <a:latin typeface="Arial" panose="020B0604020202020204" pitchFamily="34" charset="0"/>
+                <a:cs typeface="Arial" panose="020B0604020202020204" pitchFamily="34" charset="0"/>
               </a:rPr>
-              <a:t>Monitoramento desempenho de maquina</a:t>
+              <a:t>Melhorar desempenho de maquina</a:t>
             </a:r>
           </a:p>
         </p:txBody>
@@ -4212,7 +4215,10 @@
             <a:avLst/>
           </a:prstGeom>
           <a:solidFill>
-            <a:srgbClr val="99FF99"/>
+            <a:schemeClr val="tx2">
+              <a:lumMod val="60000"/>
+              <a:lumOff val="40000"/>
+            </a:schemeClr>
           </a:solidFill>
           <a:ln w="3175">
             <a:solidFill>
@@ -4251,12 +4257,12 @@
           <a:p>
             <a:pPr algn="ctr"/>
             <a:r>
-              <a:rPr lang="pt-BR" sz="1100" dirty="0">
+              <a:rPr lang="pt-BR" sz="1100" b="1" dirty="0">
                 <a:solidFill>
                   <a:schemeClr val="tx1"/>
                 </a:solidFill>
-                <a:latin typeface="Segoe Print" panose="02000600000000000000" pitchFamily="2" charset="0"/>
-                <a:cs typeface="MV Boli" panose="02000500030200090000" pitchFamily="2" charset="0"/>
+                <a:latin typeface="Arial" panose="020B0604020202020204" pitchFamily="34" charset="0"/>
+                <a:cs typeface="Arial" panose="020B0604020202020204" pitchFamily="34" charset="0"/>
               </a:rPr>
               <a:t>Agilidade na visualização de incidentes(servidores cheios ou maquinas que pararam de funcionar)</a:t>
             </a:r>
@@ -4284,7 +4290,10 @@
             <a:avLst/>
           </a:prstGeom>
           <a:solidFill>
-            <a:srgbClr val="99FF99"/>
+            <a:schemeClr val="tx2">
+              <a:lumMod val="60000"/>
+              <a:lumOff val="40000"/>
+            </a:schemeClr>
           </a:solidFill>
           <a:ln w="3175">
             <a:solidFill>
@@ -4323,12 +4332,12 @@
           <a:p>
             <a:pPr algn="ctr"/>
             <a:r>
-              <a:rPr lang="pt-BR" sz="1100" dirty="0">
+              <a:rPr lang="pt-BR" sz="1100" b="1" dirty="0">
                 <a:solidFill>
                   <a:schemeClr val="tx1"/>
                 </a:solidFill>
-                <a:latin typeface="Segoe Print" panose="02000600000000000000" pitchFamily="2" charset="0"/>
-                <a:cs typeface="MV Boli" panose="02000500030200090000" pitchFamily="2" charset="0"/>
+                <a:latin typeface="Arial" panose="020B0604020202020204" pitchFamily="34" charset="0"/>
+                <a:cs typeface="Arial" panose="020B0604020202020204" pitchFamily="34" charset="0"/>
               </a:rPr>
               <a:t>Monitoramento avançado em tempo real para melhor administração do servidor </a:t>
             </a:r>
@@ -4356,7 +4365,10 @@
             <a:avLst/>
           </a:prstGeom>
           <a:solidFill>
-            <a:srgbClr val="99FF99"/>
+            <a:schemeClr val="accent1">
+              <a:lumMod val="60000"/>
+              <a:lumOff val="40000"/>
+            </a:schemeClr>
           </a:solidFill>
           <a:ln w="3175">
             <a:solidFill>
@@ -4395,12 +4407,12 @@
           <a:p>
             <a:pPr algn="ctr"/>
             <a:r>
-              <a:rPr lang="pt-BR" sz="1100" dirty="0">
+              <a:rPr lang="pt-BR" sz="1100" b="1" dirty="0">
                 <a:solidFill>
                   <a:schemeClr val="tx1"/>
                 </a:solidFill>
-                <a:latin typeface="Segoe Print" panose="02000600000000000000" pitchFamily="2" charset="0"/>
-                <a:cs typeface="MV Boli" panose="02000500030200090000" pitchFamily="2" charset="0"/>
+                <a:latin typeface="Arial" panose="020B0604020202020204" pitchFamily="34" charset="0"/>
+                <a:cs typeface="Arial" panose="020B0604020202020204" pitchFamily="34" charset="0"/>
               </a:rPr>
               <a:t>Gerenciar processos da maquina do usuário para evitar travamentos</a:t>
             </a:r>
@@ -4428,7 +4440,7 @@
             <a:avLst/>
           </a:prstGeom>
           <a:solidFill>
-            <a:schemeClr val="accent1">
+            <a:schemeClr val="tx2">
               <a:lumMod val="60000"/>
               <a:lumOff val="40000"/>
             </a:schemeClr>
@@ -4466,12 +4478,12 @@
           <a:p>
             <a:pPr algn="ctr" defTabSz="1149969"/>
             <a:r>
-              <a:rPr lang="pt-BR" sz="1100" dirty="0">
+              <a:rPr lang="pt-BR" sz="1100" b="1" dirty="0">
                 <a:solidFill>
                   <a:schemeClr val="tx1"/>
                 </a:solidFill>
-                <a:latin typeface="Segoe Print" panose="02000600000000000000" pitchFamily="2" charset="0"/>
-                <a:cs typeface="MV Boli" panose="02000500030200090000" pitchFamily="2" charset="0"/>
+                <a:latin typeface="Arial" panose="020B0604020202020204" pitchFamily="34" charset="0"/>
+                <a:cs typeface="Arial" panose="020B0604020202020204" pitchFamily="34" charset="0"/>
               </a:rPr>
               <a:t>Monitoramento de maquinas(users)</a:t>
             </a:r>
@@ -4499,8 +4511,9 @@
             <a:avLst/>
           </a:prstGeom>
           <a:solidFill>
-            <a:schemeClr val="accent1">
-              <a:lumMod val="75000"/>
+            <a:schemeClr val="accent3">
+              <a:lumMod val="20000"/>
+              <a:lumOff val="80000"/>
             </a:schemeClr>
           </a:solidFill>
           <a:ln>
@@ -4536,12 +4549,12 @@
           <a:p>
             <a:pPr algn="ctr" defTabSz="1149969"/>
             <a:r>
-              <a:rPr lang="pt-BR" sz="1100" dirty="0">
+              <a:rPr lang="pt-BR" sz="1100" b="1" dirty="0">
                 <a:solidFill>
                   <a:schemeClr val="tx1"/>
                 </a:solidFill>
-                <a:latin typeface="Segoe Print" panose="02000600000000000000" pitchFamily="2" charset="0"/>
-                <a:cs typeface="MV Boli" panose="02000500030200090000" pitchFamily="2" charset="0"/>
+                <a:latin typeface="Arial" panose="020B0604020202020204" pitchFamily="34" charset="0"/>
+                <a:cs typeface="Arial" panose="020B0604020202020204" pitchFamily="34" charset="0"/>
               </a:rPr>
               <a:t>Melhorar a administração do servidor</a:t>
             </a:r>
@@ -4569,7 +4582,7 @@
             <a:avLst/>
           </a:prstGeom>
           <a:solidFill>
-            <a:srgbClr val="FF99CC"/>
+            <a:schemeClr val="accent5"/>
           </a:solidFill>
           <a:ln>
             <a:noFill/>
@@ -4604,12 +4617,12 @@
           <a:p>
             <a:pPr algn="ctr" defTabSz="1149969"/>
             <a:r>
-              <a:rPr lang="pt-BR" sz="1100" dirty="0">
+              <a:rPr lang="pt-BR" sz="1100" b="1" dirty="0">
                 <a:solidFill>
                   <a:schemeClr val="tx1"/>
                 </a:solidFill>
-                <a:latin typeface="Segoe Print" panose="02000600000000000000" pitchFamily="2" charset="0"/>
-                <a:cs typeface="MV Boli" panose="02000500030200090000" pitchFamily="2" charset="0"/>
+                <a:latin typeface="Arial" panose="020B0604020202020204" pitchFamily="34" charset="0"/>
+                <a:cs typeface="Arial" panose="020B0604020202020204" pitchFamily="34" charset="0"/>
               </a:rPr>
               <a:t>Melhorar o desempenho</a:t>
             </a:r>
@@ -4675,12 +4688,12 @@
           <a:p>
             <a:pPr algn="ctr" defTabSz="1149969"/>
             <a:r>
-              <a:rPr lang="pt-BR" sz="1100" dirty="0">
+              <a:rPr lang="pt-BR" sz="1100" b="1" dirty="0">
                 <a:solidFill>
                   <a:schemeClr val="tx1"/>
                 </a:solidFill>
-                <a:latin typeface="Segoe Print" panose="02000600000000000000" pitchFamily="2" charset="0"/>
-                <a:cs typeface="MV Boli" panose="02000500030200090000" pitchFamily="2" charset="0"/>
+                <a:latin typeface="Arial" panose="020B0604020202020204" pitchFamily="34" charset="0"/>
+                <a:cs typeface="Arial" panose="020B0604020202020204" pitchFamily="34" charset="0"/>
               </a:rPr>
               <a:t>Atestar a segurança dos servidores</a:t>
             </a:r>
@@ -4708,9 +4721,9 @@
             <a:avLst/>
           </a:prstGeom>
           <a:solidFill>
-            <a:schemeClr val="accent1">
-              <a:lumMod val="40000"/>
-              <a:lumOff val="60000"/>
+            <a:schemeClr val="accent3">
+              <a:lumMod val="20000"/>
+              <a:lumOff val="80000"/>
             </a:schemeClr>
           </a:solidFill>
           <a:ln>
@@ -4746,12 +4759,12 @@
           <a:p>
             <a:pPr algn="ctr"/>
             <a:r>
-              <a:rPr lang="pt-BR" sz="1100" dirty="0">
+              <a:rPr lang="pt-BR" sz="1100" b="1" dirty="0">
                 <a:solidFill>
                   <a:schemeClr val="tx1"/>
                 </a:solidFill>
-                <a:latin typeface="Segoe Print" panose="02000600000000000000" pitchFamily="2" charset="0"/>
-                <a:cs typeface="MV Boli" panose="02000500030200090000" pitchFamily="2" charset="0"/>
+                <a:latin typeface="Arial" panose="020B0604020202020204" pitchFamily="34" charset="0"/>
+                <a:cs typeface="Arial" panose="020B0604020202020204" pitchFamily="34" charset="0"/>
               </a:rPr>
               <a:t>Gerar relatórios</a:t>
             </a:r>
@@ -4779,7 +4792,7 @@
             <a:avLst/>
           </a:prstGeom>
           <a:solidFill>
-            <a:schemeClr val="accent1">
+            <a:schemeClr val="tx2">
               <a:lumMod val="60000"/>
               <a:lumOff val="40000"/>
             </a:schemeClr>
@@ -4817,12 +4830,12 @@
           <a:p>
             <a:pPr algn="ctr"/>
             <a:r>
-              <a:rPr lang="pt-BR" sz="1100" dirty="0">
+              <a:rPr lang="pt-BR" sz="1100" b="1" dirty="0">
                 <a:solidFill>
                   <a:schemeClr val="tx1"/>
                 </a:solidFill>
-                <a:latin typeface="Segoe Print" panose="02000600000000000000" pitchFamily="2" charset="0"/>
-                <a:cs typeface="MV Boli" panose="02000500030200090000" pitchFamily="2" charset="0"/>
+                <a:latin typeface="Arial" panose="020B0604020202020204" pitchFamily="34" charset="0"/>
+                <a:cs typeface="Arial" panose="020B0604020202020204" pitchFamily="34" charset="0"/>
               </a:rPr>
               <a:t>Bloquear certos tipos de software</a:t>
             </a:r>
@@ -4850,7 +4863,10 @@
             <a:avLst/>
           </a:prstGeom>
           <a:solidFill>
-            <a:srgbClr val="99FF99"/>
+            <a:schemeClr val="accent1">
+              <a:lumMod val="60000"/>
+              <a:lumOff val="40000"/>
+            </a:schemeClr>
           </a:solidFill>
           <a:ln w="3175">
             <a:solidFill>
@@ -4889,12 +4905,12 @@
           <a:p>
             <a:pPr algn="ctr"/>
             <a:r>
-              <a:rPr lang="pt-BR" sz="1100" dirty="0">
+              <a:rPr lang="pt-BR" sz="1100" b="1" dirty="0">
                 <a:solidFill>
                   <a:schemeClr val="tx1"/>
                 </a:solidFill>
-                <a:latin typeface="Segoe Print" panose="02000600000000000000" pitchFamily="2" charset="0"/>
-                <a:cs typeface="MV Boli" panose="02000500030200090000" pitchFamily="2" charset="0"/>
+                <a:latin typeface="Arial" panose="020B0604020202020204" pitchFamily="34" charset="0"/>
+                <a:cs typeface="Arial" panose="020B0604020202020204" pitchFamily="34" charset="0"/>
               </a:rPr>
               <a:t>Gerar relatórios mensais sobre problemas recorrentes dos servidores </a:t>
             </a:r>
@@ -4922,7 +4938,10 @@
             <a:avLst/>
           </a:prstGeom>
           <a:solidFill>
-            <a:srgbClr val="99FF99"/>
+            <a:schemeClr val="accent1">
+              <a:lumMod val="60000"/>
+              <a:lumOff val="40000"/>
+            </a:schemeClr>
           </a:solidFill>
           <a:ln w="3175">
             <a:solidFill>
@@ -4961,12 +4980,12 @@
           <a:p>
             <a:pPr algn="ctr"/>
             <a:r>
-              <a:rPr lang="pt-BR" sz="1100" dirty="0">
+              <a:rPr lang="pt-BR" sz="1100" b="1" dirty="0">
                 <a:solidFill>
                   <a:schemeClr val="tx1"/>
                 </a:solidFill>
-                <a:latin typeface="Segoe Print" panose="02000600000000000000" pitchFamily="2" charset="0"/>
-                <a:cs typeface="MV Boli" panose="02000500030200090000" pitchFamily="2" charset="0"/>
+                <a:latin typeface="Arial" panose="020B0604020202020204" pitchFamily="34" charset="0"/>
+                <a:cs typeface="Arial" panose="020B0604020202020204" pitchFamily="34" charset="0"/>
               </a:rPr>
               <a:t>Bloquear softwares desconhecidos para evitar hackers</a:t>
             </a:r>

</xml_diff>

<commit_message>
Alteração requisitos, user stories e projeto do Yoshi.
</commit_message>
<xml_diff>
--- a/documentacao/canvas-adaptado.pptx
+++ b/documentacao/canvas-adaptado.pptx
@@ -5087,6 +5087,13 @@
   <p:clrMapOvr>
     <a:masterClrMapping/>
   </p:clrMapOvr>
+  <p:timing>
+    <p:tnLst>
+      <p:par>
+        <p:cTn id="1" dur="indefinite" restart="never" nodeType="tmRoot"/>
+      </p:par>
+    </p:tnLst>
+  </p:timing>
 </p:sld>
 </file>
 

</xml_diff>